<commit_message>
images for presentation + template
</commit_message>
<xml_diff>
--- a/NSD presentation.pptx
+++ b/NSD presentation.pptx
@@ -5,14 +5,19 @@
     <p:sldMasterId id="2147483648" r:id="rId4"/>
   </p:sldMasterIdLst>
   <p:notesMasterIdLst>
-    <p:notesMasterId r:id="rId7"/>
+    <p:notesMasterId r:id="rId12"/>
   </p:notesMasterIdLst>
   <p:handoutMasterIdLst>
-    <p:handoutMasterId r:id="rId8"/>
+    <p:handoutMasterId r:id="rId13"/>
   </p:handoutMasterIdLst>
   <p:sldIdLst>
     <p:sldId id="256" r:id="rId5"/>
     <p:sldId id="277" r:id="rId6"/>
+    <p:sldId id="279" r:id="rId7"/>
+    <p:sldId id="282" r:id="rId8"/>
+    <p:sldId id="284" r:id="rId9"/>
+    <p:sldId id="283" r:id="rId10"/>
+    <p:sldId id="281" r:id="rId11"/>
   </p:sldIdLst>
   <p:sldSz cx="12192000" cy="6858000"/>
   <p:notesSz cx="6858000" cy="9144000"/>
@@ -120,6 +125,199 @@
     </p:ext>
   </p:extLst>
 </p:presentation>
+</file>
+
+<file path=ppt/revisionInfo.xml><?xml version="1.0" encoding="utf-8"?>
+<p1510:revInfo xmlns:a="http://schemas.openxmlformats.org/drawingml/2006/main" xmlns:r="http://schemas.openxmlformats.org/officeDocument/2006/relationships" xmlns:p1510="http://schemas.microsoft.com/office/powerpoint/2015/10/main">
+  <p1510:revLst>
+    <p1510:client id="{533456B2-61D5-4356-6458-3847A8801001}" v="11" dt="2022-08-29T10:24:31.766"/>
+    <p1510:client id="{B344E63E-9C88-4794-A4D7-B4D7D143EDE2}" v="17" dt="2022-08-29T09:03:08.129"/>
+    <p1510:client id="{BD04AE12-CB22-41D7-A3DE-7170CCE3279E}" v="45" dt="2022-08-29T09:41:03.269"/>
+  </p1510:revLst>
+</p1510:revInfo>
+</file>
+
+<file path=ppt/changesInfos/changesInfo1.xml><?xml version="1.0" encoding="utf-8"?>
+<pc:chgInfo xmlns:a="http://schemas.openxmlformats.org/drawingml/2006/main" xmlns:r="http://schemas.openxmlformats.org/officeDocument/2006/relationships" xmlns:ac="http://schemas.microsoft.com/office/drawing/2013/main/command" xmlns:pc="http://schemas.microsoft.com/office/powerpoint/2013/main/command">
+  <pc:docChgLst>
+    <pc:chgData name="pierciro caliandro" userId="S::pierciro.caliandro@alumni.uniroma2.eu::928b6c7c-e230-4570-84a7-6c0464c5bab1" providerId="AD" clId="Web-{B344E63E-9C88-4794-A4D7-B4D7D143EDE2}"/>
+    <pc:docChg chg="addSld modSld">
+      <pc:chgData name="pierciro caliandro" userId="S::pierciro.caliandro@alumni.uniroma2.eu::928b6c7c-e230-4570-84a7-6c0464c5bab1" providerId="AD" clId="Web-{B344E63E-9C88-4794-A4D7-B4D7D143EDE2}" dt="2022-08-29T09:03:06.441" v="15" actId="20577"/>
+      <pc:docMkLst>
+        <pc:docMk/>
+      </pc:docMkLst>
+      <pc:sldChg chg="modSp new">
+        <pc:chgData name="pierciro caliandro" userId="S::pierciro.caliandro@alumni.uniroma2.eu::928b6c7c-e230-4570-84a7-6c0464c5bab1" providerId="AD" clId="Web-{B344E63E-9C88-4794-A4D7-B4D7D143EDE2}" dt="2022-08-29T09:03:06.441" v="15" actId="20577"/>
+        <pc:sldMkLst>
+          <pc:docMk/>
+          <pc:sldMk cId="1413453501" sldId="278"/>
+        </pc:sldMkLst>
+        <pc:spChg chg="mod">
+          <ac:chgData name="pierciro caliandro" userId="S::pierciro.caliandro@alumni.uniroma2.eu::928b6c7c-e230-4570-84a7-6c0464c5bab1" providerId="AD" clId="Web-{B344E63E-9C88-4794-A4D7-B4D7D143EDE2}" dt="2022-08-29T09:03:06.441" v="15" actId="20577"/>
+          <ac:spMkLst>
+            <pc:docMk/>
+            <pc:sldMk cId="1413453501" sldId="278"/>
+            <ac:spMk id="2" creationId="{11D07968-4227-9652-6517-5C491DC133D4}"/>
+          </ac:spMkLst>
+        </pc:spChg>
+      </pc:sldChg>
+    </pc:docChg>
+  </pc:docChgLst>
+  <pc:docChgLst>
+    <pc:chgData name="pierciro caliandro" userId="S::pierciro.caliandro@alumni.uniroma2.eu::928b6c7c-e230-4570-84a7-6c0464c5bab1" providerId="AD" clId="Web-{BD04AE12-CB22-41D7-A3DE-7170CCE3279E}"/>
+    <pc:docChg chg="addSld delSld modSld">
+      <pc:chgData name="pierciro caliandro" userId="S::pierciro.caliandro@alumni.uniroma2.eu::928b6c7c-e230-4570-84a7-6c0464c5bab1" providerId="AD" clId="Web-{BD04AE12-CB22-41D7-A3DE-7170CCE3279E}" dt="2022-08-29T09:41:03.269" v="44"/>
+      <pc:docMkLst>
+        <pc:docMk/>
+      </pc:docMkLst>
+      <pc:sldChg chg="addSp delSp modSp del">
+        <pc:chgData name="pierciro caliandro" userId="S::pierciro.caliandro@alumni.uniroma2.eu::928b6c7c-e230-4570-84a7-6c0464c5bab1" providerId="AD" clId="Web-{BD04AE12-CB22-41D7-A3DE-7170CCE3279E}" dt="2022-08-29T09:36:35.999" v="18"/>
+        <pc:sldMkLst>
+          <pc:docMk/>
+          <pc:sldMk cId="1413453501" sldId="278"/>
+        </pc:sldMkLst>
+        <pc:spChg chg="mod">
+          <ac:chgData name="pierciro caliandro" userId="S::pierciro.caliandro@alumni.uniroma2.eu::928b6c7c-e230-4570-84a7-6c0464c5bab1" providerId="AD" clId="Web-{BD04AE12-CB22-41D7-A3DE-7170CCE3279E}" dt="2022-08-29T09:35:25.107" v="6" actId="1076"/>
+          <ac:spMkLst>
+            <pc:docMk/>
+            <pc:sldMk cId="1413453501" sldId="278"/>
+            <ac:spMk id="2" creationId="{11D07968-4227-9652-6517-5C491DC133D4}"/>
+          </ac:spMkLst>
+        </pc:spChg>
+        <pc:spChg chg="del">
+          <ac:chgData name="pierciro caliandro" userId="S::pierciro.caliandro@alumni.uniroma2.eu::928b6c7c-e230-4570-84a7-6c0464c5bab1" providerId="AD" clId="Web-{BD04AE12-CB22-41D7-A3DE-7170CCE3279E}" dt="2022-08-29T09:34:03.527" v="0"/>
+          <ac:spMkLst>
+            <pc:docMk/>
+            <pc:sldMk cId="1413453501" sldId="278"/>
+            <ac:spMk id="3" creationId="{E7BE0997-7C52-F207-FA7B-27752EB96CE3}"/>
+          </ac:spMkLst>
+        </pc:spChg>
+        <pc:picChg chg="add mod ord">
+          <ac:chgData name="pierciro caliandro" userId="S::pierciro.caliandro@alumni.uniroma2.eu::928b6c7c-e230-4570-84a7-6c0464c5bab1" providerId="AD" clId="Web-{BD04AE12-CB22-41D7-A3DE-7170CCE3279E}" dt="2022-08-29T09:34:18.777" v="5" actId="14100"/>
+          <ac:picMkLst>
+            <pc:docMk/>
+            <pc:sldMk cId="1413453501" sldId="278"/>
+            <ac:picMk id="4" creationId="{D96FE2F0-A653-2CEB-1B56-0EC3D0D762CE}"/>
+          </ac:picMkLst>
+        </pc:picChg>
+      </pc:sldChg>
+      <pc:sldChg chg="new del">
+        <pc:chgData name="pierciro caliandro" userId="S::pierciro.caliandro@alumni.uniroma2.eu::928b6c7c-e230-4570-84a7-6c0464c5bab1" providerId="AD" clId="Web-{BD04AE12-CB22-41D7-A3DE-7170CCE3279E}" dt="2022-08-29T09:35:49.326" v="8"/>
+        <pc:sldMkLst>
+          <pc:docMk/>
+          <pc:sldMk cId="3588330984" sldId="279"/>
+        </pc:sldMkLst>
+      </pc:sldChg>
+      <pc:sldChg chg="addSp modSp new mod modClrScheme chgLayout">
+        <pc:chgData name="pierciro caliandro" userId="S::pierciro.caliandro@alumni.uniroma2.eu::928b6c7c-e230-4570-84a7-6c0464c5bab1" providerId="AD" clId="Web-{BD04AE12-CB22-41D7-A3DE-7170CCE3279E}" dt="2022-08-29T09:41:03.269" v="44"/>
+        <pc:sldMkLst>
+          <pc:docMk/>
+          <pc:sldMk cId="4294478349" sldId="279"/>
+        </pc:sldMkLst>
+        <pc:spChg chg="add mod">
+          <ac:chgData name="pierciro caliandro" userId="S::pierciro.caliandro@alumni.uniroma2.eu::928b6c7c-e230-4570-84a7-6c0464c5bab1" providerId="AD" clId="Web-{BD04AE12-CB22-41D7-A3DE-7170CCE3279E}" dt="2022-08-29T09:37:25.484" v="25"/>
+          <ac:spMkLst>
+            <pc:docMk/>
+            <pc:sldMk cId="4294478349" sldId="279"/>
+            <ac:spMk id="2" creationId="{9629F5B1-EC69-A92F-80B0-6FD8F0264186}"/>
+          </ac:spMkLst>
+        </pc:spChg>
+        <pc:spChg chg="add mod">
+          <ac:chgData name="pierciro caliandro" userId="S::pierciro.caliandro@alumni.uniroma2.eu::928b6c7c-e230-4570-84a7-6c0464c5bab1" providerId="AD" clId="Web-{BD04AE12-CB22-41D7-A3DE-7170CCE3279E}" dt="2022-08-29T09:41:03.269" v="44"/>
+          <ac:spMkLst>
+            <pc:docMk/>
+            <pc:sldMk cId="4294478349" sldId="279"/>
+            <ac:spMk id="4" creationId="{5EC0C47B-832F-CC9F-AA75-C395E4A52383}"/>
+          </ac:spMkLst>
+        </pc:spChg>
+        <pc:spChg chg="add mod">
+          <ac:chgData name="pierciro caliandro" userId="S::pierciro.caliandro@alumni.uniroma2.eu::928b6c7c-e230-4570-84a7-6c0464c5bab1" providerId="AD" clId="Web-{BD04AE12-CB22-41D7-A3DE-7170CCE3279E}" dt="2022-08-29T09:37:25.484" v="25"/>
+          <ac:spMkLst>
+            <pc:docMk/>
+            <pc:sldMk cId="4294478349" sldId="279"/>
+            <ac:spMk id="8" creationId="{E697BC6F-EF55-9303-E817-8F082589D591}"/>
+          </ac:spMkLst>
+        </pc:spChg>
+        <pc:picChg chg="add mod">
+          <ac:chgData name="pierciro caliandro" userId="S::pierciro.caliandro@alumni.uniroma2.eu::928b6c7c-e230-4570-84a7-6c0464c5bab1" providerId="AD" clId="Web-{BD04AE12-CB22-41D7-A3DE-7170CCE3279E}" dt="2022-08-29T09:40:19.940" v="40" actId="1076"/>
+          <ac:picMkLst>
+            <pc:docMk/>
+            <pc:sldMk cId="4294478349" sldId="279"/>
+            <ac:picMk id="3" creationId="{D5C65AFE-435F-EBFA-A454-F3A003E02DF8}"/>
+          </ac:picMkLst>
+        </pc:picChg>
+      </pc:sldChg>
+    </pc:docChg>
+  </pc:docChgLst>
+  <pc:docChgLst>
+    <pc:chgData name="pierciro caliandro" userId="S::pierciro.caliandro@alumni.uniroma2.eu::928b6c7c-e230-4570-84a7-6c0464c5bab1" providerId="AD" clId="Web-{533456B2-61D5-4356-6458-3847A8801001}"/>
+    <pc:docChg chg="addSld delSld modSld">
+      <pc:chgData name="pierciro caliandro" userId="S::pierciro.caliandro@alumni.uniroma2.eu::928b6c7c-e230-4570-84a7-6c0464c5bab1" providerId="AD" clId="Web-{533456B2-61D5-4356-6458-3847A8801001}" dt="2022-08-29T10:24:31.766" v="9"/>
+      <pc:docMkLst>
+        <pc:docMk/>
+      </pc:docMkLst>
+      <pc:sldChg chg="delSp modSp add del">
+        <pc:chgData name="pierciro caliandro" userId="S::pierciro.caliandro@alumni.uniroma2.eu::928b6c7c-e230-4570-84a7-6c0464c5bab1" providerId="AD" clId="Web-{533456B2-61D5-4356-6458-3847A8801001}" dt="2022-08-29T10:24:31.766" v="9"/>
+        <pc:sldMkLst>
+          <pc:docMk/>
+          <pc:sldMk cId="2362216188" sldId="280"/>
+        </pc:sldMkLst>
+        <pc:spChg chg="mod">
+          <ac:chgData name="pierciro caliandro" userId="S::pierciro.caliandro@alumni.uniroma2.eu::928b6c7c-e230-4570-84a7-6c0464c5bab1" providerId="AD" clId="Web-{533456B2-61D5-4356-6458-3847A8801001}" dt="2022-08-29T10:23:58.642" v="4" actId="20577"/>
+          <ac:spMkLst>
+            <pc:docMk/>
+            <pc:sldMk cId="2362216188" sldId="280"/>
+            <ac:spMk id="2" creationId="{9629F5B1-EC69-A92F-80B0-6FD8F0264186}"/>
+          </ac:spMkLst>
+        </pc:spChg>
+        <pc:spChg chg="del">
+          <ac:chgData name="pierciro caliandro" userId="S::pierciro.caliandro@alumni.uniroma2.eu::928b6c7c-e230-4570-84a7-6c0464c5bab1" providerId="AD" clId="Web-{533456B2-61D5-4356-6458-3847A8801001}" dt="2022-08-29T10:23:21.936" v="2"/>
+          <ac:spMkLst>
+            <pc:docMk/>
+            <pc:sldMk cId="2362216188" sldId="280"/>
+            <ac:spMk id="4" creationId="{5EC0C47B-832F-CC9F-AA75-C395E4A52383}"/>
+          </ac:spMkLst>
+        </pc:spChg>
+        <pc:picChg chg="del">
+          <ac:chgData name="pierciro caliandro" userId="S::pierciro.caliandro@alumni.uniroma2.eu::928b6c7c-e230-4570-84a7-6c0464c5bab1" providerId="AD" clId="Web-{533456B2-61D5-4356-6458-3847A8801001}" dt="2022-08-29T10:23:18.030" v="1"/>
+          <ac:picMkLst>
+            <pc:docMk/>
+            <pc:sldMk cId="2362216188" sldId="280"/>
+            <ac:picMk id="3" creationId="{D5C65AFE-435F-EBFA-A454-F3A003E02DF8}"/>
+          </ac:picMkLst>
+        </pc:picChg>
+      </pc:sldChg>
+      <pc:sldChg chg="add replId">
+        <pc:chgData name="pierciro caliandro" userId="S::pierciro.caliandro@alumni.uniroma2.eu::928b6c7c-e230-4570-84a7-6c0464c5bab1" providerId="AD" clId="Web-{533456B2-61D5-4356-6458-3847A8801001}" dt="2022-08-29T10:24:06.437" v="5"/>
+        <pc:sldMkLst>
+          <pc:docMk/>
+          <pc:sldMk cId="1878724174" sldId="281"/>
+        </pc:sldMkLst>
+      </pc:sldChg>
+      <pc:sldChg chg="add replId">
+        <pc:chgData name="pierciro caliandro" userId="S::pierciro.caliandro@alumni.uniroma2.eu::928b6c7c-e230-4570-84a7-6c0464c5bab1" providerId="AD" clId="Web-{533456B2-61D5-4356-6458-3847A8801001}" dt="2022-08-29T10:24:09.094" v="6"/>
+        <pc:sldMkLst>
+          <pc:docMk/>
+          <pc:sldMk cId="3442253408" sldId="282"/>
+        </pc:sldMkLst>
+      </pc:sldChg>
+      <pc:sldChg chg="add replId">
+        <pc:chgData name="pierciro caliandro" userId="S::pierciro.caliandro@alumni.uniroma2.eu::928b6c7c-e230-4570-84a7-6c0464c5bab1" providerId="AD" clId="Web-{533456B2-61D5-4356-6458-3847A8801001}" dt="2022-08-29T10:24:11.640" v="7"/>
+        <pc:sldMkLst>
+          <pc:docMk/>
+          <pc:sldMk cId="2292474981" sldId="283"/>
+        </pc:sldMkLst>
+      </pc:sldChg>
+      <pc:sldChg chg="add replId">
+        <pc:chgData name="pierciro caliandro" userId="S::pierciro.caliandro@alumni.uniroma2.eu::928b6c7c-e230-4570-84a7-6c0464c5bab1" providerId="AD" clId="Web-{533456B2-61D5-4356-6458-3847A8801001}" dt="2022-08-29T10:24:15.500" v="8"/>
+        <pc:sldMkLst>
+          <pc:docMk/>
+          <pc:sldMk cId="1100340457" sldId="284"/>
+        </pc:sldMkLst>
+      </pc:sldChg>
+    </pc:docChg>
+  </pc:docChgLst>
+</pc:chgInfo>
 </file>
 
 <file path=ppt/diagrams/colors1.xml><?xml version="1.0" encoding="utf-8"?>
@@ -3014,7 +3212,7 @@
             <a:pPr rtl="0"/>
             <a:fld id="{35CEB73A-EAD8-4600-A937-149261040EA7}" type="datetime1">
               <a:rPr lang="it-IT" smtClean="0"/>
-              <a:t>28/08/2022</a:t>
+              <a:t>29/08/2022</a:t>
             </a:fld>
             <a:endParaRPr lang="it-IT"/>
           </a:p>
@@ -3184,7 +3382,7 @@
             <a:pPr rtl="0"/>
             <a:fld id="{09578EB8-0800-413D-B171-4C9FED7732A0}" type="datetime1">
               <a:rPr lang="it-IT" noProof="0" smtClean="0"/>
-              <a:t>28/08/2022</a:t>
+              <a:t>29/08/2022</a:t>
             </a:fld>
             <a:endParaRPr lang="it-IT" noProof="0"/>
           </a:p>
@@ -12421,7 +12619,7 @@
             <a:pPr rtl="0"/>
             <a:fld id="{B38DECDD-C56B-4B99-815C-4DC374BD0502}" type="datetime1">
               <a:rPr lang="it-IT" noProof="0" smtClean="0"/>
-              <a:t>28/08/2022</a:t>
+              <a:t>29/08/2022</a:t>
             </a:fld>
             <a:endParaRPr lang="it-IT" noProof="0"/>
           </a:p>
@@ -12625,7 +12823,7 @@
             <a:pPr rtl="0"/>
             <a:fld id="{A91270D5-CA2E-4CCE-B3E3-1ED4C617F5FD}" type="datetime1">
               <a:rPr lang="it-IT" noProof="0" smtClean="0"/>
-              <a:t>28/08/2022</a:t>
+              <a:t>29/08/2022</a:t>
             </a:fld>
             <a:endParaRPr lang="it-IT" noProof="0"/>
           </a:p>
@@ -12802,7 +13000,7 @@
             <a:pPr rtl="0"/>
             <a:fld id="{3AD02021-081D-4BCD-8619-111A80C86AA4}" type="datetime1">
               <a:rPr lang="it-IT" noProof="0" smtClean="0"/>
-              <a:t>28/08/2022</a:t>
+              <a:t>29/08/2022</a:t>
             </a:fld>
             <a:endParaRPr lang="it-IT" noProof="0"/>
           </a:p>
@@ -13004,7 +13202,7 @@
             <a:pPr rtl="0"/>
             <a:fld id="{FC2CFC9B-8199-4464-9645-214B6EFF3046}" type="datetime1">
               <a:rPr lang="it-IT" noProof="0" smtClean="0"/>
-              <a:t>28/08/2022</a:t>
+              <a:t>29/08/2022</a:t>
             </a:fld>
             <a:endParaRPr lang="it-IT" noProof="0"/>
           </a:p>
@@ -21900,7 +22098,7 @@
             <a:pPr rtl="0"/>
             <a:fld id="{268EC901-D7B4-418A-90B0-E5FCBA6FFEA7}" type="datetime1">
               <a:rPr lang="it-IT" noProof="0" smtClean="0"/>
-              <a:t>28/08/2022</a:t>
+              <a:t>29/08/2022</a:t>
             </a:fld>
             <a:endParaRPr lang="it-IT" noProof="0"/>
           </a:p>
@@ -22170,7 +22368,7 @@
             <a:pPr rtl="0"/>
             <a:fld id="{D1B961D9-E81B-44AF-B812-435DD72BA78F}" type="datetime1">
               <a:rPr lang="it-IT" noProof="0" smtClean="0"/>
-              <a:t>28/08/2022</a:t>
+              <a:t>29/08/2022</a:t>
             </a:fld>
             <a:endParaRPr lang="it-IT" noProof="0"/>
           </a:p>
@@ -22564,7 +22762,7 @@
             <a:pPr rtl="0"/>
             <a:fld id="{C3FF653A-F944-4ACA-BE4F-5261464A4CE1}" type="datetime1">
               <a:rPr lang="it-IT" noProof="0" smtClean="0"/>
-              <a:t>28/08/2022</a:t>
+              <a:t>29/08/2022</a:t>
             </a:fld>
             <a:endParaRPr lang="it-IT" noProof="0"/>
           </a:p>
@@ -22680,7 +22878,7 @@
             <a:pPr rtl="0"/>
             <a:fld id="{00B835D5-4872-4F83-9549-4195BD19C9E7}" type="datetime1">
               <a:rPr lang="it-IT" noProof="0" smtClean="0"/>
-              <a:t>28/08/2022</a:t>
+              <a:t>29/08/2022</a:t>
             </a:fld>
             <a:endParaRPr lang="it-IT" noProof="0"/>
           </a:p>
@@ -22773,7 +22971,7 @@
             <a:pPr rtl="0"/>
             <a:fld id="{285AFA1D-B403-4233-93F5-9C17BC134037}" type="datetime1">
               <a:rPr lang="it-IT" noProof="0" smtClean="0"/>
-              <a:t>28/08/2022</a:t>
+              <a:t>29/08/2022</a:t>
             </a:fld>
             <a:endParaRPr lang="it-IT" noProof="0"/>
           </a:p>
@@ -23060,7 +23258,7 @@
             <a:pPr rtl="0"/>
             <a:fld id="{C0037F34-7F89-47FC-B829-DD18E8CE430E}" type="datetime1">
               <a:rPr lang="it-IT" noProof="0" smtClean="0"/>
-              <a:t>28/08/2022</a:t>
+              <a:t>29/08/2022</a:t>
             </a:fld>
             <a:endParaRPr lang="it-IT" noProof="0"/>
           </a:p>
@@ -23338,7 +23536,7 @@
             <a:pPr rtl="0"/>
             <a:fld id="{E2945EFA-1B37-428A-B390-4F21411152A4}" type="datetime1">
               <a:rPr lang="it-IT" noProof="0" smtClean="0"/>
-              <a:t>28/08/2022</a:t>
+              <a:t>29/08/2022</a:t>
             </a:fld>
             <a:endParaRPr lang="it-IT" noProof="0"/>
           </a:p>
@@ -23585,7 +23783,7 @@
             <a:pPr rtl="0"/>
             <a:fld id="{A6877D91-AE2A-4013-A171-54DDAEEA4374}" type="datetime1">
               <a:rPr lang="it-IT" noProof="0" smtClean="0"/>
-              <a:t>28/08/2022</a:t>
+              <a:t>29/08/2022</a:t>
             </a:fld>
             <a:endParaRPr lang="it-IT" noProof="0"/>
           </a:p>
@@ -24501,6 +24699,1011 @@
 </p:sld>
 </file>
 
+<file path=ppt/slides/slide3.xml><?xml version="1.0" encoding="utf-8"?>
+<p:sld xmlns:a="http://schemas.openxmlformats.org/drawingml/2006/main" xmlns:r="http://schemas.openxmlformats.org/officeDocument/2006/relationships" xmlns:p="http://schemas.openxmlformats.org/presentationml/2006/main">
+  <p:cSld>
+    <p:spTree>
+      <p:nvGrpSpPr>
+        <p:cNvPr id="1" name=""/>
+        <p:cNvGrpSpPr/>
+        <p:nvPr/>
+      </p:nvGrpSpPr>
+      <p:grpSpPr>
+        <a:xfrm>
+          <a:off x="0" y="0"/>
+          <a:ext cx="0" cy="0"/>
+          <a:chOff x="0" y="0"/>
+          <a:chExt cx="0" cy="0"/>
+        </a:xfrm>
+      </p:grpSpPr>
+      <p:sp>
+        <p:nvSpPr>
+          <p:cNvPr id="2" name="CasellaDiTesto 1">
+            <a:extLst>
+              <a:ext uri="{FF2B5EF4-FFF2-40B4-BE49-F238E27FC236}">
+                <a16:creationId xmlns:a16="http://schemas.microsoft.com/office/drawing/2014/main" id="{9629F5B1-EC69-A92F-80B0-6FD8F0264186}"/>
+              </a:ext>
+            </a:extLst>
+          </p:cNvPr>
+          <p:cNvSpPr txBox="1"/>
+          <p:nvPr/>
+        </p:nvSpPr>
+        <p:spPr>
+          <a:xfrm>
+            <a:off x="1024128" y="471509"/>
+            <a:ext cx="4389120" cy="1737360"/>
+          </a:xfrm>
+          <a:prstGeom prst="rect">
+            <a:avLst/>
+          </a:prstGeom>
+        </p:spPr>
+        <p:txBody>
+          <a:bodyPr rot="0" spcFirstLastPara="0" vertOverflow="overflow" horzOverflow="overflow" vert="horz" lIns="91440" tIns="45720" rIns="91440" bIns="45720" numCol="1" spcCol="0" rtlCol="0" fromWordArt="0" anchor="ctr" anchorCtr="0" forceAA="0" compatLnSpc="1">
+            <a:prstTxWarp prst="textNoShape">
+              <a:avLst/>
+            </a:prstTxWarp>
+            <a:normAutofit/>
+          </a:bodyPr>
+          <a:lstStyle/>
+          <a:p>
+            <a:pPr defTabSz="914400">
+              <a:lnSpc>
+                <a:spcPct val="80000"/>
+              </a:lnSpc>
+              <a:spcBef>
+                <a:spcPct val="0"/>
+              </a:spcBef>
+              <a:spcAft>
+                <a:spcPts val="600"/>
+              </a:spcAft>
+            </a:pPr>
+            <a:r>
+              <a:rPr lang="it-IT" sz="4000" kern="1200" cap="all" spc="100" baseline="0">
+                <a:solidFill>
+                  <a:schemeClr val="tx1">
+                    <a:lumMod val="95000"/>
+                    <a:lumOff val="5000"/>
+                  </a:schemeClr>
+                </a:solidFill>
+                <a:latin typeface="+mj-lt"/>
+                <a:ea typeface="+mj-ea"/>
+                <a:cs typeface="+mj-cs"/>
+              </a:rPr>
+              <a:t>AS 200 CONFIGURATION​</a:t>
+            </a:r>
+          </a:p>
+        </p:txBody>
+      </p:sp>
+      <p:pic>
+        <p:nvPicPr>
+          <p:cNvPr id="3" name="Immagine 3">
+            <a:extLst>
+              <a:ext uri="{FF2B5EF4-FFF2-40B4-BE49-F238E27FC236}">
+                <a16:creationId xmlns:a16="http://schemas.microsoft.com/office/drawing/2014/main" id="{D5C65AFE-435F-EBFA-A454-F3A003E02DF8}"/>
+              </a:ext>
+            </a:extLst>
+          </p:cNvPr>
+          <p:cNvPicPr>
+            <a:picLocks noChangeAspect="1"/>
+          </p:cNvPicPr>
+          <p:nvPr/>
+        </p:nvPicPr>
+        <p:blipFill>
+          <a:blip r:embed="rId2"/>
+          <a:stretch>
+            <a:fillRect/>
+          </a:stretch>
+        </p:blipFill>
+        <p:spPr>
+          <a:xfrm>
+            <a:off x="5715000" y="1583992"/>
+            <a:ext cx="5678424" cy="3662583"/>
+          </a:xfrm>
+          <a:prstGeom prst="rect">
+            <a:avLst/>
+          </a:prstGeom>
+          <a:noFill/>
+        </p:spPr>
+      </p:pic>
+      <p:sp>
+        <p:nvSpPr>
+          <p:cNvPr id="8" name="Text Placeholder 3">
+            <a:extLst>
+              <a:ext uri="{FF2B5EF4-FFF2-40B4-BE49-F238E27FC236}">
+                <a16:creationId xmlns:a16="http://schemas.microsoft.com/office/drawing/2014/main" id="{E697BC6F-EF55-9303-E817-8F082589D591}"/>
+              </a:ext>
+            </a:extLst>
+          </p:cNvPr>
+          <p:cNvSpPr>
+            <a:spLocks noGrp="1"/>
+          </p:cNvSpPr>
+          <p:nvPr>
+            <p:ph type="body" sz="half" idx="2"/>
+          </p:nvPr>
+        </p:nvSpPr>
+        <p:spPr>
+          <a:xfrm>
+            <a:off x="1024128" y="2257506"/>
+            <a:ext cx="4389120" cy="3762294"/>
+          </a:xfrm>
+        </p:spPr>
+        <p:txBody>
+          <a:bodyPr/>
+          <a:lstStyle/>
+          <a:p>
+            <a:endParaRPr lang="en-US"/>
+          </a:p>
+        </p:txBody>
+      </p:sp>
+      <p:sp>
+        <p:nvSpPr>
+          <p:cNvPr id="4" name="Connettore 3">
+            <a:extLst>
+              <a:ext uri="{FF2B5EF4-FFF2-40B4-BE49-F238E27FC236}">
+                <a16:creationId xmlns:a16="http://schemas.microsoft.com/office/drawing/2014/main" id="{5EC0C47B-832F-CC9F-AA75-C395E4A52383}"/>
+              </a:ext>
+            </a:extLst>
+          </p:cNvPr>
+          <p:cNvSpPr/>
+          <p:nvPr/>
+        </p:nvSpPr>
+        <p:spPr>
+          <a:xfrm>
+            <a:off x="8283498" y="2940203"/>
+            <a:ext cx="789877" cy="752707"/>
+          </a:xfrm>
+          <a:prstGeom prst="flowChartConnector">
+            <a:avLst/>
+          </a:prstGeom>
+          <a:noFill/>
+          <a:ln w="28575">
+            <a:solidFill>
+              <a:srgbClr val="FF0000"/>
+            </a:solidFill>
+          </a:ln>
+        </p:spPr>
+        <p:style>
+          <a:lnRef idx="2">
+            <a:schemeClr val="accent1">
+              <a:shade val="50000"/>
+            </a:schemeClr>
+          </a:lnRef>
+          <a:fillRef idx="1">
+            <a:schemeClr val="accent1"/>
+          </a:fillRef>
+          <a:effectRef idx="0">
+            <a:schemeClr val="accent1"/>
+          </a:effectRef>
+          <a:fontRef idx="minor">
+            <a:schemeClr val="lt1"/>
+          </a:fontRef>
+        </p:style>
+        <p:txBody>
+          <a:bodyPr rtlCol="0" anchor="ctr"/>
+          <a:lstStyle/>
+          <a:p>
+            <a:pPr algn="ctr"/>
+            <a:endParaRPr lang="it-IT"/>
+          </a:p>
+        </p:txBody>
+      </p:sp>
+    </p:spTree>
+    <p:extLst>
+      <p:ext uri="{BB962C8B-B14F-4D97-AF65-F5344CB8AC3E}">
+        <p14:creationId xmlns:p14="http://schemas.microsoft.com/office/powerpoint/2010/main" val="4294478349"/>
+      </p:ext>
+    </p:extLst>
+  </p:cSld>
+  <p:clrMapOvr>
+    <a:masterClrMapping/>
+  </p:clrMapOvr>
+</p:sld>
+</file>
+
+<file path=ppt/slides/slide4.xml><?xml version="1.0" encoding="utf-8"?>
+<p:sld xmlns:a="http://schemas.openxmlformats.org/drawingml/2006/main" xmlns:r="http://schemas.openxmlformats.org/officeDocument/2006/relationships" xmlns:p="http://schemas.openxmlformats.org/presentationml/2006/main">
+  <p:cSld>
+    <p:spTree>
+      <p:nvGrpSpPr>
+        <p:cNvPr id="1" name=""/>
+        <p:cNvGrpSpPr/>
+        <p:nvPr/>
+      </p:nvGrpSpPr>
+      <p:grpSpPr>
+        <a:xfrm>
+          <a:off x="0" y="0"/>
+          <a:ext cx="0" cy="0"/>
+          <a:chOff x="0" y="0"/>
+          <a:chExt cx="0" cy="0"/>
+        </a:xfrm>
+      </p:grpSpPr>
+      <p:sp>
+        <p:nvSpPr>
+          <p:cNvPr id="2" name="CasellaDiTesto 1">
+            <a:extLst>
+              <a:ext uri="{FF2B5EF4-FFF2-40B4-BE49-F238E27FC236}">
+                <a16:creationId xmlns:a16="http://schemas.microsoft.com/office/drawing/2014/main" id="{9629F5B1-EC69-A92F-80B0-6FD8F0264186}"/>
+              </a:ext>
+            </a:extLst>
+          </p:cNvPr>
+          <p:cNvSpPr txBox="1"/>
+          <p:nvPr/>
+        </p:nvSpPr>
+        <p:spPr>
+          <a:xfrm>
+            <a:off x="1024128" y="471509"/>
+            <a:ext cx="4389120" cy="1737360"/>
+          </a:xfrm>
+          <a:prstGeom prst="rect">
+            <a:avLst/>
+          </a:prstGeom>
+        </p:spPr>
+        <p:txBody>
+          <a:bodyPr rot="0" spcFirstLastPara="0" vertOverflow="overflow" horzOverflow="overflow" vert="horz" lIns="91440" tIns="45720" rIns="91440" bIns="45720" numCol="1" spcCol="0" rtlCol="0" fromWordArt="0" anchor="ctr" anchorCtr="0" forceAA="0" compatLnSpc="1">
+            <a:prstTxWarp prst="textNoShape">
+              <a:avLst/>
+            </a:prstTxWarp>
+            <a:normAutofit/>
+          </a:bodyPr>
+          <a:lstStyle/>
+          <a:p>
+            <a:pPr defTabSz="914400">
+              <a:lnSpc>
+                <a:spcPct val="80000"/>
+              </a:lnSpc>
+              <a:spcBef>
+                <a:spcPct val="0"/>
+              </a:spcBef>
+              <a:spcAft>
+                <a:spcPts val="600"/>
+              </a:spcAft>
+            </a:pPr>
+            <a:r>
+              <a:rPr lang="it-IT" sz="4000" kern="1200" cap="all" spc="100" baseline="0">
+                <a:solidFill>
+                  <a:schemeClr val="tx1">
+                    <a:lumMod val="95000"/>
+                    <a:lumOff val="5000"/>
+                  </a:schemeClr>
+                </a:solidFill>
+                <a:latin typeface="+mj-lt"/>
+                <a:ea typeface="+mj-ea"/>
+                <a:cs typeface="+mj-cs"/>
+              </a:rPr>
+              <a:t>AS 200 CONFIGURATION​</a:t>
+            </a:r>
+          </a:p>
+        </p:txBody>
+      </p:sp>
+      <p:pic>
+        <p:nvPicPr>
+          <p:cNvPr id="3" name="Immagine 3">
+            <a:extLst>
+              <a:ext uri="{FF2B5EF4-FFF2-40B4-BE49-F238E27FC236}">
+                <a16:creationId xmlns:a16="http://schemas.microsoft.com/office/drawing/2014/main" id="{D5C65AFE-435F-EBFA-A454-F3A003E02DF8}"/>
+              </a:ext>
+            </a:extLst>
+          </p:cNvPr>
+          <p:cNvPicPr>
+            <a:picLocks noChangeAspect="1"/>
+          </p:cNvPicPr>
+          <p:nvPr/>
+        </p:nvPicPr>
+        <p:blipFill>
+          <a:blip r:embed="rId2"/>
+          <a:stretch>
+            <a:fillRect/>
+          </a:stretch>
+        </p:blipFill>
+        <p:spPr>
+          <a:xfrm>
+            <a:off x="5715000" y="1583992"/>
+            <a:ext cx="5678424" cy="3662583"/>
+          </a:xfrm>
+          <a:prstGeom prst="rect">
+            <a:avLst/>
+          </a:prstGeom>
+          <a:noFill/>
+        </p:spPr>
+      </p:pic>
+      <p:sp>
+        <p:nvSpPr>
+          <p:cNvPr id="8" name="Text Placeholder 3">
+            <a:extLst>
+              <a:ext uri="{FF2B5EF4-FFF2-40B4-BE49-F238E27FC236}">
+                <a16:creationId xmlns:a16="http://schemas.microsoft.com/office/drawing/2014/main" id="{E697BC6F-EF55-9303-E817-8F082589D591}"/>
+              </a:ext>
+            </a:extLst>
+          </p:cNvPr>
+          <p:cNvSpPr>
+            <a:spLocks noGrp="1"/>
+          </p:cNvSpPr>
+          <p:nvPr>
+            <p:ph type="body" sz="half" idx="2"/>
+          </p:nvPr>
+        </p:nvSpPr>
+        <p:spPr>
+          <a:xfrm>
+            <a:off x="1024128" y="2257506"/>
+            <a:ext cx="4389120" cy="3762294"/>
+          </a:xfrm>
+        </p:spPr>
+        <p:txBody>
+          <a:bodyPr/>
+          <a:lstStyle/>
+          <a:p>
+            <a:endParaRPr lang="en-US"/>
+          </a:p>
+        </p:txBody>
+      </p:sp>
+      <p:sp>
+        <p:nvSpPr>
+          <p:cNvPr id="4" name="Connettore 3">
+            <a:extLst>
+              <a:ext uri="{FF2B5EF4-FFF2-40B4-BE49-F238E27FC236}">
+                <a16:creationId xmlns:a16="http://schemas.microsoft.com/office/drawing/2014/main" id="{5EC0C47B-832F-CC9F-AA75-C395E4A52383}"/>
+              </a:ext>
+            </a:extLst>
+          </p:cNvPr>
+          <p:cNvSpPr/>
+          <p:nvPr/>
+        </p:nvSpPr>
+        <p:spPr>
+          <a:xfrm>
+            <a:off x="8283498" y="2940203"/>
+            <a:ext cx="789877" cy="752707"/>
+          </a:xfrm>
+          <a:prstGeom prst="flowChartConnector">
+            <a:avLst/>
+          </a:prstGeom>
+          <a:noFill/>
+          <a:ln w="28575">
+            <a:solidFill>
+              <a:srgbClr val="FF0000"/>
+            </a:solidFill>
+          </a:ln>
+        </p:spPr>
+        <p:style>
+          <a:lnRef idx="2">
+            <a:schemeClr val="accent1">
+              <a:shade val="50000"/>
+            </a:schemeClr>
+          </a:lnRef>
+          <a:fillRef idx="1">
+            <a:schemeClr val="accent1"/>
+          </a:fillRef>
+          <a:effectRef idx="0">
+            <a:schemeClr val="accent1"/>
+          </a:effectRef>
+          <a:fontRef idx="minor">
+            <a:schemeClr val="lt1"/>
+          </a:fontRef>
+        </p:style>
+        <p:txBody>
+          <a:bodyPr rtlCol="0" anchor="ctr"/>
+          <a:lstStyle/>
+          <a:p>
+            <a:pPr algn="ctr"/>
+            <a:endParaRPr lang="it-IT"/>
+          </a:p>
+        </p:txBody>
+      </p:sp>
+    </p:spTree>
+    <p:extLst>
+      <p:ext uri="{BB962C8B-B14F-4D97-AF65-F5344CB8AC3E}">
+        <p14:creationId xmlns:p14="http://schemas.microsoft.com/office/powerpoint/2010/main" val="3442253408"/>
+      </p:ext>
+    </p:extLst>
+  </p:cSld>
+  <p:clrMapOvr>
+    <a:masterClrMapping/>
+  </p:clrMapOvr>
+</p:sld>
+</file>
+
+<file path=ppt/slides/slide5.xml><?xml version="1.0" encoding="utf-8"?>
+<p:sld xmlns:a="http://schemas.openxmlformats.org/drawingml/2006/main" xmlns:r="http://schemas.openxmlformats.org/officeDocument/2006/relationships" xmlns:p="http://schemas.openxmlformats.org/presentationml/2006/main">
+  <p:cSld>
+    <p:spTree>
+      <p:nvGrpSpPr>
+        <p:cNvPr id="1" name=""/>
+        <p:cNvGrpSpPr/>
+        <p:nvPr/>
+      </p:nvGrpSpPr>
+      <p:grpSpPr>
+        <a:xfrm>
+          <a:off x="0" y="0"/>
+          <a:ext cx="0" cy="0"/>
+          <a:chOff x="0" y="0"/>
+          <a:chExt cx="0" cy="0"/>
+        </a:xfrm>
+      </p:grpSpPr>
+      <p:sp>
+        <p:nvSpPr>
+          <p:cNvPr id="2" name="CasellaDiTesto 1">
+            <a:extLst>
+              <a:ext uri="{FF2B5EF4-FFF2-40B4-BE49-F238E27FC236}">
+                <a16:creationId xmlns:a16="http://schemas.microsoft.com/office/drawing/2014/main" id="{9629F5B1-EC69-A92F-80B0-6FD8F0264186}"/>
+              </a:ext>
+            </a:extLst>
+          </p:cNvPr>
+          <p:cNvSpPr txBox="1"/>
+          <p:nvPr/>
+        </p:nvSpPr>
+        <p:spPr>
+          <a:xfrm>
+            <a:off x="1024128" y="471509"/>
+            <a:ext cx="4389120" cy="1737360"/>
+          </a:xfrm>
+          <a:prstGeom prst="rect">
+            <a:avLst/>
+          </a:prstGeom>
+        </p:spPr>
+        <p:txBody>
+          <a:bodyPr rot="0" spcFirstLastPara="0" vertOverflow="overflow" horzOverflow="overflow" vert="horz" lIns="91440" tIns="45720" rIns="91440" bIns="45720" numCol="1" spcCol="0" rtlCol="0" fromWordArt="0" anchor="ctr" anchorCtr="0" forceAA="0" compatLnSpc="1">
+            <a:prstTxWarp prst="textNoShape">
+              <a:avLst/>
+            </a:prstTxWarp>
+            <a:normAutofit/>
+          </a:bodyPr>
+          <a:lstStyle/>
+          <a:p>
+            <a:pPr defTabSz="914400">
+              <a:lnSpc>
+                <a:spcPct val="80000"/>
+              </a:lnSpc>
+              <a:spcBef>
+                <a:spcPct val="0"/>
+              </a:spcBef>
+              <a:spcAft>
+                <a:spcPts val="600"/>
+              </a:spcAft>
+            </a:pPr>
+            <a:r>
+              <a:rPr lang="it-IT" sz="4000" kern="1200" cap="all" spc="100" baseline="0">
+                <a:solidFill>
+                  <a:schemeClr val="tx1">
+                    <a:lumMod val="95000"/>
+                    <a:lumOff val="5000"/>
+                  </a:schemeClr>
+                </a:solidFill>
+                <a:latin typeface="+mj-lt"/>
+                <a:ea typeface="+mj-ea"/>
+                <a:cs typeface="+mj-cs"/>
+              </a:rPr>
+              <a:t>AS 200 CONFIGURATION​</a:t>
+            </a:r>
+          </a:p>
+        </p:txBody>
+      </p:sp>
+      <p:pic>
+        <p:nvPicPr>
+          <p:cNvPr id="3" name="Immagine 3">
+            <a:extLst>
+              <a:ext uri="{FF2B5EF4-FFF2-40B4-BE49-F238E27FC236}">
+                <a16:creationId xmlns:a16="http://schemas.microsoft.com/office/drawing/2014/main" id="{D5C65AFE-435F-EBFA-A454-F3A003E02DF8}"/>
+              </a:ext>
+            </a:extLst>
+          </p:cNvPr>
+          <p:cNvPicPr>
+            <a:picLocks noChangeAspect="1"/>
+          </p:cNvPicPr>
+          <p:nvPr/>
+        </p:nvPicPr>
+        <p:blipFill>
+          <a:blip r:embed="rId2"/>
+          <a:stretch>
+            <a:fillRect/>
+          </a:stretch>
+        </p:blipFill>
+        <p:spPr>
+          <a:xfrm>
+            <a:off x="5715000" y="1583992"/>
+            <a:ext cx="5678424" cy="3662583"/>
+          </a:xfrm>
+          <a:prstGeom prst="rect">
+            <a:avLst/>
+          </a:prstGeom>
+          <a:noFill/>
+        </p:spPr>
+      </p:pic>
+      <p:sp>
+        <p:nvSpPr>
+          <p:cNvPr id="8" name="Text Placeholder 3">
+            <a:extLst>
+              <a:ext uri="{FF2B5EF4-FFF2-40B4-BE49-F238E27FC236}">
+                <a16:creationId xmlns:a16="http://schemas.microsoft.com/office/drawing/2014/main" id="{E697BC6F-EF55-9303-E817-8F082589D591}"/>
+              </a:ext>
+            </a:extLst>
+          </p:cNvPr>
+          <p:cNvSpPr>
+            <a:spLocks noGrp="1"/>
+          </p:cNvSpPr>
+          <p:nvPr>
+            <p:ph type="body" sz="half" idx="2"/>
+          </p:nvPr>
+        </p:nvSpPr>
+        <p:spPr>
+          <a:xfrm>
+            <a:off x="1024128" y="2257506"/>
+            <a:ext cx="4389120" cy="3762294"/>
+          </a:xfrm>
+        </p:spPr>
+        <p:txBody>
+          <a:bodyPr/>
+          <a:lstStyle/>
+          <a:p>
+            <a:endParaRPr lang="en-US"/>
+          </a:p>
+        </p:txBody>
+      </p:sp>
+      <p:sp>
+        <p:nvSpPr>
+          <p:cNvPr id="4" name="Connettore 3">
+            <a:extLst>
+              <a:ext uri="{FF2B5EF4-FFF2-40B4-BE49-F238E27FC236}">
+                <a16:creationId xmlns:a16="http://schemas.microsoft.com/office/drawing/2014/main" id="{5EC0C47B-832F-CC9F-AA75-C395E4A52383}"/>
+              </a:ext>
+            </a:extLst>
+          </p:cNvPr>
+          <p:cNvSpPr/>
+          <p:nvPr/>
+        </p:nvSpPr>
+        <p:spPr>
+          <a:xfrm>
+            <a:off x="8283498" y="2940203"/>
+            <a:ext cx="789877" cy="752707"/>
+          </a:xfrm>
+          <a:prstGeom prst="flowChartConnector">
+            <a:avLst/>
+          </a:prstGeom>
+          <a:noFill/>
+          <a:ln w="28575">
+            <a:solidFill>
+              <a:srgbClr val="FF0000"/>
+            </a:solidFill>
+          </a:ln>
+        </p:spPr>
+        <p:style>
+          <a:lnRef idx="2">
+            <a:schemeClr val="accent1">
+              <a:shade val="50000"/>
+            </a:schemeClr>
+          </a:lnRef>
+          <a:fillRef idx="1">
+            <a:schemeClr val="accent1"/>
+          </a:fillRef>
+          <a:effectRef idx="0">
+            <a:schemeClr val="accent1"/>
+          </a:effectRef>
+          <a:fontRef idx="minor">
+            <a:schemeClr val="lt1"/>
+          </a:fontRef>
+        </p:style>
+        <p:txBody>
+          <a:bodyPr rtlCol="0" anchor="ctr"/>
+          <a:lstStyle/>
+          <a:p>
+            <a:pPr algn="ctr"/>
+            <a:endParaRPr lang="it-IT"/>
+          </a:p>
+        </p:txBody>
+      </p:sp>
+    </p:spTree>
+    <p:extLst>
+      <p:ext uri="{BB962C8B-B14F-4D97-AF65-F5344CB8AC3E}">
+        <p14:creationId xmlns:p14="http://schemas.microsoft.com/office/powerpoint/2010/main" val="1100340457"/>
+      </p:ext>
+    </p:extLst>
+  </p:cSld>
+  <p:clrMapOvr>
+    <a:masterClrMapping/>
+  </p:clrMapOvr>
+</p:sld>
+</file>
+
+<file path=ppt/slides/slide6.xml><?xml version="1.0" encoding="utf-8"?>
+<p:sld xmlns:a="http://schemas.openxmlformats.org/drawingml/2006/main" xmlns:r="http://schemas.openxmlformats.org/officeDocument/2006/relationships" xmlns:p="http://schemas.openxmlformats.org/presentationml/2006/main">
+  <p:cSld>
+    <p:spTree>
+      <p:nvGrpSpPr>
+        <p:cNvPr id="1" name=""/>
+        <p:cNvGrpSpPr/>
+        <p:nvPr/>
+      </p:nvGrpSpPr>
+      <p:grpSpPr>
+        <a:xfrm>
+          <a:off x="0" y="0"/>
+          <a:ext cx="0" cy="0"/>
+          <a:chOff x="0" y="0"/>
+          <a:chExt cx="0" cy="0"/>
+        </a:xfrm>
+      </p:grpSpPr>
+      <p:sp>
+        <p:nvSpPr>
+          <p:cNvPr id="2" name="CasellaDiTesto 1">
+            <a:extLst>
+              <a:ext uri="{FF2B5EF4-FFF2-40B4-BE49-F238E27FC236}">
+                <a16:creationId xmlns:a16="http://schemas.microsoft.com/office/drawing/2014/main" id="{9629F5B1-EC69-A92F-80B0-6FD8F0264186}"/>
+              </a:ext>
+            </a:extLst>
+          </p:cNvPr>
+          <p:cNvSpPr txBox="1"/>
+          <p:nvPr/>
+        </p:nvSpPr>
+        <p:spPr>
+          <a:xfrm>
+            <a:off x="1024128" y="471509"/>
+            <a:ext cx="4389120" cy="1737360"/>
+          </a:xfrm>
+          <a:prstGeom prst="rect">
+            <a:avLst/>
+          </a:prstGeom>
+        </p:spPr>
+        <p:txBody>
+          <a:bodyPr rot="0" spcFirstLastPara="0" vertOverflow="overflow" horzOverflow="overflow" vert="horz" lIns="91440" tIns="45720" rIns="91440" bIns="45720" numCol="1" spcCol="0" rtlCol="0" fromWordArt="0" anchor="ctr" anchorCtr="0" forceAA="0" compatLnSpc="1">
+            <a:prstTxWarp prst="textNoShape">
+              <a:avLst/>
+            </a:prstTxWarp>
+            <a:normAutofit/>
+          </a:bodyPr>
+          <a:lstStyle/>
+          <a:p>
+            <a:pPr defTabSz="914400">
+              <a:lnSpc>
+                <a:spcPct val="80000"/>
+              </a:lnSpc>
+              <a:spcBef>
+                <a:spcPct val="0"/>
+              </a:spcBef>
+              <a:spcAft>
+                <a:spcPts val="600"/>
+              </a:spcAft>
+            </a:pPr>
+            <a:r>
+              <a:rPr lang="it-IT" sz="4000" kern="1200" cap="all" spc="100" baseline="0">
+                <a:solidFill>
+                  <a:schemeClr val="tx1">
+                    <a:lumMod val="95000"/>
+                    <a:lumOff val="5000"/>
+                  </a:schemeClr>
+                </a:solidFill>
+                <a:latin typeface="+mj-lt"/>
+                <a:ea typeface="+mj-ea"/>
+                <a:cs typeface="+mj-cs"/>
+              </a:rPr>
+              <a:t>AS 200 CONFIGURATION​</a:t>
+            </a:r>
+          </a:p>
+        </p:txBody>
+      </p:sp>
+      <p:pic>
+        <p:nvPicPr>
+          <p:cNvPr id="3" name="Immagine 3">
+            <a:extLst>
+              <a:ext uri="{FF2B5EF4-FFF2-40B4-BE49-F238E27FC236}">
+                <a16:creationId xmlns:a16="http://schemas.microsoft.com/office/drawing/2014/main" id="{D5C65AFE-435F-EBFA-A454-F3A003E02DF8}"/>
+              </a:ext>
+            </a:extLst>
+          </p:cNvPr>
+          <p:cNvPicPr>
+            <a:picLocks noChangeAspect="1"/>
+          </p:cNvPicPr>
+          <p:nvPr/>
+        </p:nvPicPr>
+        <p:blipFill>
+          <a:blip r:embed="rId2"/>
+          <a:stretch>
+            <a:fillRect/>
+          </a:stretch>
+        </p:blipFill>
+        <p:spPr>
+          <a:xfrm>
+            <a:off x="5715000" y="1583992"/>
+            <a:ext cx="5678424" cy="3662583"/>
+          </a:xfrm>
+          <a:prstGeom prst="rect">
+            <a:avLst/>
+          </a:prstGeom>
+          <a:noFill/>
+        </p:spPr>
+      </p:pic>
+      <p:sp>
+        <p:nvSpPr>
+          <p:cNvPr id="8" name="Text Placeholder 3">
+            <a:extLst>
+              <a:ext uri="{FF2B5EF4-FFF2-40B4-BE49-F238E27FC236}">
+                <a16:creationId xmlns:a16="http://schemas.microsoft.com/office/drawing/2014/main" id="{E697BC6F-EF55-9303-E817-8F082589D591}"/>
+              </a:ext>
+            </a:extLst>
+          </p:cNvPr>
+          <p:cNvSpPr>
+            <a:spLocks noGrp="1"/>
+          </p:cNvSpPr>
+          <p:nvPr>
+            <p:ph type="body" sz="half" idx="2"/>
+          </p:nvPr>
+        </p:nvSpPr>
+        <p:spPr>
+          <a:xfrm>
+            <a:off x="1024128" y="2257506"/>
+            <a:ext cx="4389120" cy="3762294"/>
+          </a:xfrm>
+        </p:spPr>
+        <p:txBody>
+          <a:bodyPr/>
+          <a:lstStyle/>
+          <a:p>
+            <a:endParaRPr lang="en-US"/>
+          </a:p>
+        </p:txBody>
+      </p:sp>
+      <p:sp>
+        <p:nvSpPr>
+          <p:cNvPr id="4" name="Connettore 3">
+            <a:extLst>
+              <a:ext uri="{FF2B5EF4-FFF2-40B4-BE49-F238E27FC236}">
+                <a16:creationId xmlns:a16="http://schemas.microsoft.com/office/drawing/2014/main" id="{5EC0C47B-832F-CC9F-AA75-C395E4A52383}"/>
+              </a:ext>
+            </a:extLst>
+          </p:cNvPr>
+          <p:cNvSpPr/>
+          <p:nvPr/>
+        </p:nvSpPr>
+        <p:spPr>
+          <a:xfrm>
+            <a:off x="8283498" y="2940203"/>
+            <a:ext cx="789877" cy="752707"/>
+          </a:xfrm>
+          <a:prstGeom prst="flowChartConnector">
+            <a:avLst/>
+          </a:prstGeom>
+          <a:noFill/>
+          <a:ln w="28575">
+            <a:solidFill>
+              <a:srgbClr val="FF0000"/>
+            </a:solidFill>
+          </a:ln>
+        </p:spPr>
+        <p:style>
+          <a:lnRef idx="2">
+            <a:schemeClr val="accent1">
+              <a:shade val="50000"/>
+            </a:schemeClr>
+          </a:lnRef>
+          <a:fillRef idx="1">
+            <a:schemeClr val="accent1"/>
+          </a:fillRef>
+          <a:effectRef idx="0">
+            <a:schemeClr val="accent1"/>
+          </a:effectRef>
+          <a:fontRef idx="minor">
+            <a:schemeClr val="lt1"/>
+          </a:fontRef>
+        </p:style>
+        <p:txBody>
+          <a:bodyPr rtlCol="0" anchor="ctr"/>
+          <a:lstStyle/>
+          <a:p>
+            <a:pPr algn="ctr"/>
+            <a:endParaRPr lang="it-IT"/>
+          </a:p>
+        </p:txBody>
+      </p:sp>
+    </p:spTree>
+    <p:extLst>
+      <p:ext uri="{BB962C8B-B14F-4D97-AF65-F5344CB8AC3E}">
+        <p14:creationId xmlns:p14="http://schemas.microsoft.com/office/powerpoint/2010/main" val="2292474981"/>
+      </p:ext>
+    </p:extLst>
+  </p:cSld>
+  <p:clrMapOvr>
+    <a:masterClrMapping/>
+  </p:clrMapOvr>
+</p:sld>
+</file>
+
+<file path=ppt/slides/slide7.xml><?xml version="1.0" encoding="utf-8"?>
+<p:sld xmlns:a="http://schemas.openxmlformats.org/drawingml/2006/main" xmlns:r="http://schemas.openxmlformats.org/officeDocument/2006/relationships" xmlns:p="http://schemas.openxmlformats.org/presentationml/2006/main">
+  <p:cSld>
+    <p:spTree>
+      <p:nvGrpSpPr>
+        <p:cNvPr id="1" name=""/>
+        <p:cNvGrpSpPr/>
+        <p:nvPr/>
+      </p:nvGrpSpPr>
+      <p:grpSpPr>
+        <a:xfrm>
+          <a:off x="0" y="0"/>
+          <a:ext cx="0" cy="0"/>
+          <a:chOff x="0" y="0"/>
+          <a:chExt cx="0" cy="0"/>
+        </a:xfrm>
+      </p:grpSpPr>
+      <p:sp>
+        <p:nvSpPr>
+          <p:cNvPr id="2" name="CasellaDiTesto 1">
+            <a:extLst>
+              <a:ext uri="{FF2B5EF4-FFF2-40B4-BE49-F238E27FC236}">
+                <a16:creationId xmlns:a16="http://schemas.microsoft.com/office/drawing/2014/main" id="{9629F5B1-EC69-A92F-80B0-6FD8F0264186}"/>
+              </a:ext>
+            </a:extLst>
+          </p:cNvPr>
+          <p:cNvSpPr txBox="1"/>
+          <p:nvPr/>
+        </p:nvSpPr>
+        <p:spPr>
+          <a:xfrm>
+            <a:off x="1024128" y="471509"/>
+            <a:ext cx="4389120" cy="1737360"/>
+          </a:xfrm>
+          <a:prstGeom prst="rect">
+            <a:avLst/>
+          </a:prstGeom>
+        </p:spPr>
+        <p:txBody>
+          <a:bodyPr rot="0" spcFirstLastPara="0" vertOverflow="overflow" horzOverflow="overflow" vert="horz" lIns="91440" tIns="45720" rIns="91440" bIns="45720" numCol="1" spcCol="0" rtlCol="0" fromWordArt="0" anchor="ctr" anchorCtr="0" forceAA="0" compatLnSpc="1">
+            <a:prstTxWarp prst="textNoShape">
+              <a:avLst/>
+            </a:prstTxWarp>
+            <a:normAutofit/>
+          </a:bodyPr>
+          <a:lstStyle/>
+          <a:p>
+            <a:pPr defTabSz="914400">
+              <a:lnSpc>
+                <a:spcPct val="80000"/>
+              </a:lnSpc>
+              <a:spcBef>
+                <a:spcPct val="0"/>
+              </a:spcBef>
+              <a:spcAft>
+                <a:spcPts val="600"/>
+              </a:spcAft>
+            </a:pPr>
+            <a:r>
+              <a:rPr lang="it-IT" sz="4000" kern="1200" cap="all" spc="100" baseline="0">
+                <a:solidFill>
+                  <a:schemeClr val="tx1">
+                    <a:lumMod val="95000"/>
+                    <a:lumOff val="5000"/>
+                  </a:schemeClr>
+                </a:solidFill>
+                <a:latin typeface="+mj-lt"/>
+                <a:ea typeface="+mj-ea"/>
+                <a:cs typeface="+mj-cs"/>
+              </a:rPr>
+              <a:t>AS 200 CONFIGURATION​</a:t>
+            </a:r>
+          </a:p>
+        </p:txBody>
+      </p:sp>
+      <p:pic>
+        <p:nvPicPr>
+          <p:cNvPr id="3" name="Immagine 3">
+            <a:extLst>
+              <a:ext uri="{FF2B5EF4-FFF2-40B4-BE49-F238E27FC236}">
+                <a16:creationId xmlns:a16="http://schemas.microsoft.com/office/drawing/2014/main" id="{D5C65AFE-435F-EBFA-A454-F3A003E02DF8}"/>
+              </a:ext>
+            </a:extLst>
+          </p:cNvPr>
+          <p:cNvPicPr>
+            <a:picLocks noChangeAspect="1"/>
+          </p:cNvPicPr>
+          <p:nvPr/>
+        </p:nvPicPr>
+        <p:blipFill>
+          <a:blip r:embed="rId2"/>
+          <a:stretch>
+            <a:fillRect/>
+          </a:stretch>
+        </p:blipFill>
+        <p:spPr>
+          <a:xfrm>
+            <a:off x="5715000" y="1583992"/>
+            <a:ext cx="5678424" cy="3662583"/>
+          </a:xfrm>
+          <a:prstGeom prst="rect">
+            <a:avLst/>
+          </a:prstGeom>
+          <a:noFill/>
+        </p:spPr>
+      </p:pic>
+      <p:sp>
+        <p:nvSpPr>
+          <p:cNvPr id="8" name="Text Placeholder 3">
+            <a:extLst>
+              <a:ext uri="{FF2B5EF4-FFF2-40B4-BE49-F238E27FC236}">
+                <a16:creationId xmlns:a16="http://schemas.microsoft.com/office/drawing/2014/main" id="{E697BC6F-EF55-9303-E817-8F082589D591}"/>
+              </a:ext>
+            </a:extLst>
+          </p:cNvPr>
+          <p:cNvSpPr>
+            <a:spLocks noGrp="1"/>
+          </p:cNvSpPr>
+          <p:nvPr>
+            <p:ph type="body" sz="half" idx="2"/>
+          </p:nvPr>
+        </p:nvSpPr>
+        <p:spPr>
+          <a:xfrm>
+            <a:off x="1024128" y="2257506"/>
+            <a:ext cx="4389120" cy="3762294"/>
+          </a:xfrm>
+        </p:spPr>
+        <p:txBody>
+          <a:bodyPr/>
+          <a:lstStyle/>
+          <a:p>
+            <a:endParaRPr lang="en-US"/>
+          </a:p>
+        </p:txBody>
+      </p:sp>
+      <p:sp>
+        <p:nvSpPr>
+          <p:cNvPr id="4" name="Connettore 3">
+            <a:extLst>
+              <a:ext uri="{FF2B5EF4-FFF2-40B4-BE49-F238E27FC236}">
+                <a16:creationId xmlns:a16="http://schemas.microsoft.com/office/drawing/2014/main" id="{5EC0C47B-832F-CC9F-AA75-C395E4A52383}"/>
+              </a:ext>
+            </a:extLst>
+          </p:cNvPr>
+          <p:cNvSpPr/>
+          <p:nvPr/>
+        </p:nvSpPr>
+        <p:spPr>
+          <a:xfrm>
+            <a:off x="8283498" y="2940203"/>
+            <a:ext cx="789877" cy="752707"/>
+          </a:xfrm>
+          <a:prstGeom prst="flowChartConnector">
+            <a:avLst/>
+          </a:prstGeom>
+          <a:noFill/>
+          <a:ln w="28575">
+            <a:solidFill>
+              <a:srgbClr val="FF0000"/>
+            </a:solidFill>
+          </a:ln>
+        </p:spPr>
+        <p:style>
+          <a:lnRef idx="2">
+            <a:schemeClr val="accent1">
+              <a:shade val="50000"/>
+            </a:schemeClr>
+          </a:lnRef>
+          <a:fillRef idx="1">
+            <a:schemeClr val="accent1"/>
+          </a:fillRef>
+          <a:effectRef idx="0">
+            <a:schemeClr val="accent1"/>
+          </a:effectRef>
+          <a:fontRef idx="minor">
+            <a:schemeClr val="lt1"/>
+          </a:fontRef>
+        </p:style>
+        <p:txBody>
+          <a:bodyPr rtlCol="0" anchor="ctr"/>
+          <a:lstStyle/>
+          <a:p>
+            <a:pPr algn="ctr"/>
+            <a:endParaRPr lang="it-IT"/>
+          </a:p>
+        </p:txBody>
+      </p:sp>
+    </p:spTree>
+    <p:extLst>
+      <p:ext uri="{BB962C8B-B14F-4D97-AF65-F5344CB8AC3E}">
+        <p14:creationId xmlns:p14="http://schemas.microsoft.com/office/powerpoint/2010/main" val="1878724174"/>
+      </p:ext>
+    </p:extLst>
+  </p:cSld>
+  <p:clrMapOvr>
+    <a:masterClrMapping/>
+  </p:clrMapOvr>
+</p:sld>
+</file>
+
 <file path=ppt/theme/theme1.xml><?xml version="1.0" encoding="utf-8"?>
 <a:theme xmlns:a="http://schemas.openxmlformats.org/drawingml/2006/main" name="Integrale">
   <a:themeElements>
@@ -25326,18 +26529,18 @@
 </file>
 
 <file path=customXml/item1.xml><?xml version="1.0" encoding="utf-8"?>
-<p:properties xmlns:p="http://schemas.microsoft.com/office/2006/metadata/properties" xmlns:xsi="http://www.w3.org/2001/XMLSchema-instance" xmlns:pc="http://schemas.microsoft.com/office/infopath/2007/PartnerControls">
-  <documentManagement/>
-</p:properties>
-</file>
-
-<file path=customXml/item2.xml><?xml version="1.0" encoding="utf-8"?>
 <?mso-contentType ?>
 <FormTemplates xmlns="http://schemas.microsoft.com/sharepoint/v3/contenttype/forms">
   <Display>DocumentLibraryForm</Display>
   <Edit>DocumentLibraryForm</Edit>
   <New>DocumentLibraryForm</New>
 </FormTemplates>
+</file>
+
+<file path=customXml/item2.xml><?xml version="1.0" encoding="utf-8"?>
+<p:properties xmlns:p="http://schemas.microsoft.com/office/2006/metadata/properties" xmlns:xsi="http://www.w3.org/2001/XMLSchema-instance" xmlns:pc="http://schemas.microsoft.com/office/infopath/2007/PartnerControls">
+  <documentManagement/>
+</p:properties>
 </file>
 
 <file path=customXml/item3.xml><?xml version="1.0" encoding="utf-8"?>
@@ -25550,6 +26753,14 @@
 </file>
 
 <file path=customXml/itemProps1.xml><?xml version="1.0" encoding="utf-8"?>
+<ds:datastoreItem xmlns:ds="http://schemas.openxmlformats.org/officeDocument/2006/customXml" ds:itemID="{4F44C90D-2A62-4985-9618-3460247437B1}">
+  <ds:schemaRefs>
+    <ds:schemaRef ds:uri="http://schemas.microsoft.com/sharepoint/v3/contenttype/forms"/>
+  </ds:schemaRefs>
+</ds:datastoreItem>
+</file>
+
+<file path=customXml/itemProps2.xml><?xml version="1.0" encoding="utf-8"?>
 <ds:datastoreItem xmlns:ds="http://schemas.openxmlformats.org/officeDocument/2006/customXml" ds:itemID="{788A2F88-55C5-4ED1-9541-807C65424763}">
   <ds:schemaRefs>
     <ds:schemaRef ds:uri="http://purl.org/dc/dcmitype/"/>
@@ -25562,14 +26773,6 @@
     <ds:schemaRef ds:uri="http://schemas.openxmlformats.org/package/2006/metadata/core-properties"/>
     <ds:schemaRef ds:uri="835fbd07-a3b3-49bb-be66-70693cc02c94"/>
     <ds:schemaRef ds:uri="http://schemas.microsoft.com/office/2006/metadata/properties"/>
-  </ds:schemaRefs>
-</ds:datastoreItem>
-</file>
-
-<file path=customXml/itemProps2.xml><?xml version="1.0" encoding="utf-8"?>
-<ds:datastoreItem xmlns:ds="http://schemas.openxmlformats.org/officeDocument/2006/customXml" ds:itemID="{4F44C90D-2A62-4985-9618-3460247437B1}">
-  <ds:schemaRefs>
-    <ds:schemaRef ds:uri="http://schemas.microsoft.com/sharepoint/v3/contenttype/forms"/>
   </ds:schemaRefs>
 </ds:datastoreItem>
 </file>

</xml_diff>